<commit_message>
fix session 02 objectives
</commit_message>
<xml_diff>
--- a/002-Control-Flow/Control Flow - Slides.pptx
+++ b/002-Control-Flow/Control Flow - Slides.pptx
@@ -34075,7 +34075,7 @@
         <p:spPr>
           <a:xfrm>
             <a:off x="693418" y="1287703"/>
-            <a:ext cx="10805163" cy="3693319"/>
+            <a:ext cx="10805163" cy="3590727"/>
           </a:xfrm>
           <a:prstGeom prst="rect">
             <a:avLst/>
@@ -34236,7 +34236,7 @@
             </a:pPr>
             <a:r>
               <a:rPr lang="en" dirty="0"/>
-              <a:t>Use the Python interpreter to perform simple mathematical operations.</a:t>
+              <a:t>Compare values and logically combine comparison results</a:t>
             </a:r>
           </a:p>
           <a:p>
@@ -34252,7 +34252,7 @@
             </a:pPr>
             <a:r>
               <a:rPr lang="en" dirty="0"/>
-              <a:t>Output any text using Python.</a:t>
+              <a:t>Manipulate lists of objects with a new, powerful datatype</a:t>
             </a:r>
           </a:p>
           <a:p>
@@ -34268,7 +34268,7 @@
             </a:pPr>
             <a:r>
               <a:rPr lang="en" dirty="0"/>
-              <a:t>Capture text input from the user.</a:t>
+              <a:t>Conditionally execute or skip code</a:t>
             </a:r>
           </a:p>
           <a:p>
@@ -34284,7 +34284,7 @@
             </a:pPr>
             <a:r>
               <a:rPr lang="en" dirty="0"/>
-              <a:t>Store and retrieve information from variables.</a:t>
+              <a:t>Iterate over lists, strings and number sequences</a:t>
             </a:r>
           </a:p>
           <a:p>
@@ -34300,40 +34300,7 @@
             </a:pPr>
             <a:r>
               <a:rPr lang="en" dirty="0"/>
-              <a:t>Use numeric types </a:t>
-            </a:r>
-            <a:r>
-              <a:rPr lang="en" dirty="0" err="1">
-                <a:latin typeface="Consolas" panose="020B0609020204030204" pitchFamily="49" charset="0"/>
-                <a:cs typeface="Consolas" panose="020B0609020204030204" pitchFamily="49" charset="0"/>
-              </a:rPr>
-              <a:t>int</a:t>
-            </a:r>
-            <a:r>
-              <a:rPr lang="en" dirty="0"/>
-              <a:t>, </a:t>
-            </a:r>
-            <a:r>
-              <a:rPr lang="en" dirty="0">
-                <a:latin typeface="Consolas" panose="020B0609020204030204" pitchFamily="49" charset="0"/>
-                <a:cs typeface="Consolas" panose="020B0609020204030204" pitchFamily="49" charset="0"/>
-              </a:rPr>
-              <a:t>float</a:t>
-            </a:r>
-            <a:r>
-              <a:rPr lang="en" dirty="0"/>
-              <a:t> and </a:t>
-            </a:r>
-            <a:r>
-              <a:rPr lang="en" dirty="0">
-                <a:latin typeface="Consolas" panose="020B0609020204030204" pitchFamily="49" charset="0"/>
-                <a:cs typeface="Consolas" panose="020B0609020204030204" pitchFamily="49" charset="0"/>
-              </a:rPr>
-              <a:t>complex</a:t>
-            </a:r>
-            <a:r>
-              <a:rPr lang="en" dirty="0"/>
-              <a:t> and perform deeper math.</a:t>
+              <a:t>Loop over code until a condition is met</a:t>
             </a:r>
           </a:p>
           <a:p>
@@ -34349,34 +34316,7 @@
             </a:pPr>
             <a:r>
               <a:rPr lang="en" dirty="0"/>
-              <a:t>Manipulate text data using the </a:t>
-            </a:r>
-            <a:r>
-              <a:rPr lang="en" dirty="0" err="1">
-                <a:latin typeface="Consolas" panose="020B0609020204030204" pitchFamily="49" charset="0"/>
-                <a:cs typeface="Consolas" panose="020B0609020204030204" pitchFamily="49" charset="0"/>
-              </a:rPr>
-              <a:t>str</a:t>
-            </a:r>
-            <a:r>
-              <a:rPr lang="en" dirty="0"/>
-              <a:t> type.</a:t>
-            </a:r>
-          </a:p>
-          <a:p>
-            <a:pPr marL="1940560" marR="5080" indent="-287020">
-              <a:lnSpc>
-                <a:spcPct val="100000"/>
-              </a:lnSpc>
-              <a:spcBef>
-                <a:spcPts val="805"/>
-              </a:spcBef>
-              <a:buFont typeface="Zapf Dingbats"/>
-              <a:buChar char="➠"/>
-            </a:pPr>
-            <a:r>
-              <a:rPr lang="en" dirty="0"/>
-              <a:t>Start using the Python interpreter on your own.</a:t>
+              <a:t>Use some powerful built-in tools from the Python language to make iteration simple and expressive</a:t>
             </a:r>
           </a:p>
           <a:p>

</xml_diff>

<commit_message>
update control flow slides
</commit_message>
<xml_diff>
--- a/002-Control-Flow/Control Flow - Slides.pptx
+++ b/002-Control-Flow/Control Flow - Slides.pptx
@@ -34075,7 +34075,7 @@
         <p:spPr>
           <a:xfrm>
             <a:off x="693418" y="1287703"/>
-            <a:ext cx="10805163" cy="1036181"/>
+            <a:ext cx="10805163" cy="3590727"/>
           </a:xfrm>
           <a:prstGeom prst="rect">
             <a:avLst/>
@@ -34222,6 +34222,102 @@
             <a:endParaRPr lang="en" dirty="0">
               <a:latin typeface="Wingdings 3"/>
             </a:endParaRPr>
+          </a:p>
+          <a:p>
+            <a:pPr marL="1940560" marR="5080" indent="-287020">
+              <a:lnSpc>
+                <a:spcPct val="100000"/>
+              </a:lnSpc>
+              <a:spcBef>
+                <a:spcPts val="805"/>
+              </a:spcBef>
+              <a:buFont typeface="Zapf Dingbats"/>
+              <a:buChar char="➠"/>
+            </a:pPr>
+            <a:r>
+              <a:rPr lang="en" dirty="0"/>
+              <a:t>Compare values and logically combine comparison results</a:t>
+            </a:r>
+          </a:p>
+          <a:p>
+            <a:pPr marL="1940560" marR="5080" indent="-287020">
+              <a:lnSpc>
+                <a:spcPct val="100000"/>
+              </a:lnSpc>
+              <a:spcBef>
+                <a:spcPts val="805"/>
+              </a:spcBef>
+              <a:buFont typeface="Zapf Dingbats"/>
+              <a:buChar char="➠"/>
+            </a:pPr>
+            <a:r>
+              <a:rPr lang="en" dirty="0"/>
+              <a:t>Manipulate lists of objects with a new, powerful datatype</a:t>
+            </a:r>
+          </a:p>
+          <a:p>
+            <a:pPr marL="1940560" marR="5080" indent="-287020">
+              <a:lnSpc>
+                <a:spcPct val="100000"/>
+              </a:lnSpc>
+              <a:spcBef>
+                <a:spcPts val="805"/>
+              </a:spcBef>
+              <a:buFont typeface="Zapf Dingbats"/>
+              <a:buChar char="➠"/>
+            </a:pPr>
+            <a:r>
+              <a:rPr lang="en" dirty="0"/>
+              <a:t>Conditionally execute or skip code</a:t>
+            </a:r>
+          </a:p>
+          <a:p>
+            <a:pPr marL="1940560" marR="5080" indent="-287020">
+              <a:lnSpc>
+                <a:spcPct val="100000"/>
+              </a:lnSpc>
+              <a:spcBef>
+                <a:spcPts val="805"/>
+              </a:spcBef>
+              <a:buFont typeface="Zapf Dingbats"/>
+              <a:buChar char="➠"/>
+            </a:pPr>
+            <a:r>
+              <a:rPr lang="en" dirty="0"/>
+              <a:t>Iterate over lists, strings and number sequences</a:t>
+            </a:r>
+          </a:p>
+          <a:p>
+            <a:pPr marL="1940560" marR="5080" indent="-287020">
+              <a:lnSpc>
+                <a:spcPct val="100000"/>
+              </a:lnSpc>
+              <a:spcBef>
+                <a:spcPts val="805"/>
+              </a:spcBef>
+              <a:buFont typeface="Zapf Dingbats"/>
+              <a:buChar char="➠"/>
+            </a:pPr>
+            <a:r>
+              <a:rPr lang="en" dirty="0"/>
+              <a:t>Loop over code until a condition is met</a:t>
+            </a:r>
+          </a:p>
+          <a:p>
+            <a:pPr marL="1940560" marR="5080" indent="-287020">
+              <a:lnSpc>
+                <a:spcPct val="100000"/>
+              </a:lnSpc>
+              <a:spcBef>
+                <a:spcPts val="805"/>
+              </a:spcBef>
+              <a:buFont typeface="Zapf Dingbats"/>
+              <a:buChar char="➠"/>
+            </a:pPr>
+            <a:r>
+              <a:rPr lang="en" dirty="0"/>
+              <a:t>Use some powerful built-in tools from the Python language to make iteration simple and expressive</a:t>
+            </a:r>
           </a:p>
           <a:p>
             <a:pPr marL="1940560" marR="5080" indent="-287020">
@@ -40308,14 +40404,14 @@
           <p:nvPr>
             <p:extLst>
               <p:ext uri="{D42A27DB-BD31-4B8C-83A1-F6EECF244321}">
-                <p14:modId xmlns:p14="http://schemas.microsoft.com/office/powerpoint/2010/main" val="749614720"/>
+                <p14:modId xmlns:p14="http://schemas.microsoft.com/office/powerpoint/2010/main" val="3955242727"/>
               </p:ext>
             </p:extLst>
           </p:nvPr>
         </p:nvGraphicFramePr>
         <p:xfrm>
           <a:off x="2400176" y="1212972"/>
-          <a:ext cx="8654021" cy="4097256"/>
+          <a:ext cx="8654021" cy="4449787"/>
         </p:xfrm>
         <a:graphic>
           <a:graphicData uri="http://schemas.openxmlformats.org/drawingml/2006/table">
@@ -41186,21 +41282,14 @@
                       </a:pPr>
                       <a:r>
                         <a:rPr lang="en-US" sz="1400" dirty="0">
-                          <a:latin typeface="Arial" panose="020B0604020202020204" pitchFamily="34" charset="0"/>
-                          <a:cs typeface="Arial" panose="020B0604020202020204" pitchFamily="34" charset="0"/>
+                          <a:latin typeface="Arial"/>
+                          <a:cs typeface="Arial"/>
                         </a:rPr>
-                        <a:t>More about </a:t>
-                      </a:r>
-                      <a:r>
-                        <a:rPr lang="en-US" sz="1400" dirty="0">
-                          <a:latin typeface="Consolas" panose="020B0609020204030204" pitchFamily="49" charset="0"/>
-                          <a:cs typeface="Consolas" panose="020B0609020204030204" pitchFamily="49" charset="0"/>
-                        </a:rPr>
-                        <a:t>list</a:t>
+                        <a:t>Boolean type and comparison operators</a:t>
                       </a:r>
                       <a:endParaRPr sz="1400" dirty="0">
-                        <a:latin typeface="Consolas" panose="020B0609020204030204" pitchFamily="49" charset="0"/>
-                        <a:cs typeface="Consolas" panose="020B0609020204030204" pitchFamily="49" charset="0"/>
+                        <a:latin typeface="Arial"/>
+                        <a:cs typeface="Arial"/>
                       </a:endParaRPr>
                     </a:p>
                   </a:txBody>
@@ -41319,7 +41408,7 @@
                           <a:latin typeface="Arial"/>
                           <a:cs typeface="Arial"/>
                         </a:rPr>
-                        <a:t>15:00</a:t>
+                        <a:t>15:15</a:t>
                       </a:r>
                       <a:endParaRPr sz="1400" dirty="0">
                         <a:latin typeface="Arial"/>
@@ -41386,7 +41475,7 @@
                           <a:latin typeface="Arial"/>
                           <a:cs typeface="Arial"/>
                         </a:rPr>
-                        <a:t>30</a:t>
+                        <a:t>45</a:t>
                       </a:r>
                       <a:endParaRPr sz="1400" dirty="0">
                         <a:latin typeface="Arial"/>
@@ -41501,22 +41590,22 @@
                       </a:pPr>
                       <a:r>
                         <a:rPr lang="en-US" sz="1400" dirty="0">
-                          <a:latin typeface="Arial" panose="020B0604020202020204" pitchFamily="34" charset="0"/>
-                          <a:cs typeface="Arial" panose="020B0604020202020204" pitchFamily="34" charset="0"/>
+                          <a:latin typeface="Arial"/>
+                          <a:cs typeface="Arial"/>
                         </a:rPr>
-                        <a:t>Other sequence types: </a:t>
+                        <a:t>Conditionals: </a:t>
                       </a:r>
                       <a:r>
-                        <a:rPr lang="en-US" sz="1400" dirty="0" err="1">
+                        <a:rPr lang="en-US" sz="1400" dirty="0">
                           <a:latin typeface="Consolas" panose="020B0609020204030204" pitchFamily="49" charset="0"/>
                           <a:cs typeface="Consolas" panose="020B0609020204030204" pitchFamily="49" charset="0"/>
                         </a:rPr>
-                        <a:t>str</a:t>
+                        <a:t>if</a:t>
                       </a:r>
                       <a:r>
                         <a:rPr lang="en-US" sz="1400" dirty="0">
-                          <a:latin typeface="Arial" panose="020B0604020202020204" pitchFamily="34" charset="0"/>
-                          <a:cs typeface="Arial" panose="020B0604020202020204" pitchFamily="34" charset="0"/>
+                          <a:latin typeface="Arial"/>
+                          <a:cs typeface="Arial"/>
                         </a:rPr>
                         <a:t> – </a:t>
                       </a:r>
@@ -41525,21 +41614,7 @@
                           <a:latin typeface="Consolas" panose="020B0609020204030204" pitchFamily="49" charset="0"/>
                           <a:cs typeface="Consolas" panose="020B0609020204030204" pitchFamily="49" charset="0"/>
                         </a:rPr>
-                        <a:t>tuple</a:t>
-                      </a:r>
-                      <a:r>
-                        <a:rPr lang="en-US" sz="1400" dirty="0">
-                          <a:latin typeface="Arial" panose="020B0604020202020204" pitchFamily="34" charset="0"/>
-                          <a:cs typeface="Arial" panose="020B0604020202020204" pitchFamily="34" charset="0"/>
-                        </a:rPr>
-                        <a:t> – </a:t>
-                      </a:r>
-                      <a:r>
-                        <a:rPr lang="en-US" sz="1400" dirty="0">
-                          <a:latin typeface="Consolas" panose="020B0609020204030204" pitchFamily="49" charset="0"/>
-                          <a:cs typeface="Consolas" panose="020B0609020204030204" pitchFamily="49" charset="0"/>
-                        </a:rPr>
-                        <a:t>set</a:t>
+                        <a:t>else</a:t>
                       </a:r>
                     </a:p>
                   </a:txBody>
@@ -41600,7 +41675,7 @@
                           <a:latin typeface="Arial"/>
                           <a:cs typeface="Arial"/>
                         </a:rPr>
-                        <a:t>15:00</a:t>
+                        <a:t>15:15</a:t>
                       </a:r>
                       <a:endParaRPr sz="1400" dirty="0">
                         <a:latin typeface="Arial"/>
@@ -41730,7 +41805,7 @@
                           <a:latin typeface="Arial"/>
                           <a:cs typeface="Arial"/>
                         </a:rPr>
-                        <a:t>00:45</a:t>
+                        <a:t>00:30</a:t>
                       </a:r>
                       <a:endParaRPr sz="1400" dirty="0">
                         <a:latin typeface="Arial"/>
@@ -42207,23 +42282,47 @@
                         </a:lnSpc>
                       </a:pPr>
                       <a:r>
-                        <a:rPr lang="en-US" sz="1400" dirty="0">
-                          <a:latin typeface="Arial" panose="020B0604020202020204" pitchFamily="34" charset="0"/>
-                          <a:cs typeface="Arial" panose="020B0604020202020204" pitchFamily="34" charset="0"/>
+                        <a:rPr lang="en" sz="1400" dirty="0">
+                          <a:latin typeface="Arial"/>
+                          <a:cs typeface="Arial"/>
                         </a:rPr>
-                        <a:t>Associative container: </a:t>
+                        <a:t>Loops Part I: Iteration / </a:t>
                       </a:r>
                       <a:r>
-                        <a:rPr lang="en-US" sz="1400" dirty="0" err="1">
+                        <a:rPr lang="en" sz="1400" dirty="0">
                           <a:latin typeface="Consolas" panose="020B0609020204030204" pitchFamily="49" charset="0"/>
                           <a:cs typeface="Consolas" panose="020B0609020204030204" pitchFamily="49" charset="0"/>
                         </a:rPr>
-                        <a:t>dict</a:t>
+                        <a:t>list</a:t>
                       </a:r>
-                      <a:endParaRPr sz="1400" dirty="0">
-                        <a:latin typeface="Consolas" panose="020B0609020204030204" pitchFamily="49" charset="0"/>
-                        <a:cs typeface="Consolas" panose="020B0609020204030204" pitchFamily="49" charset="0"/>
-                      </a:endParaRPr>
+                      <a:r>
+                        <a:rPr lang="en" sz="1400" dirty="0">
+                          <a:latin typeface="Arial"/>
+                          <a:cs typeface="Arial"/>
+                        </a:rPr>
+                        <a:t> – </a:t>
+                      </a:r>
+                      <a:r>
+                        <a:rPr lang="en" sz="1400" dirty="0">
+                          <a:latin typeface="Consolas" panose="020B0609020204030204" pitchFamily="49" charset="0"/>
+                          <a:cs typeface="Consolas" panose="020B0609020204030204" pitchFamily="49" charset="0"/>
+                        </a:rPr>
+                        <a:t>for</a:t>
+                      </a:r>
+                      <a:r>
+                        <a:rPr lang="en" sz="1400" dirty="0">
+                          <a:latin typeface="Arial"/>
+                          <a:cs typeface="Arial"/>
+                        </a:rPr>
+                        <a:t> – </a:t>
+                      </a:r>
+                      <a:r>
+                        <a:rPr lang="en" sz="1400" dirty="0">
+                          <a:latin typeface="Consolas" panose="020B0609020204030204" pitchFamily="49" charset="0"/>
+                          <a:cs typeface="Consolas" panose="020B0609020204030204" pitchFamily="49" charset="0"/>
+                        </a:rPr>
+                        <a:t>range</a:t>
+                      </a:r>
                     </a:p>
                   </a:txBody>
                   <a:tcPr marL="0" marR="0" marT="0" marB="0">
@@ -42538,11 +42637,340 @@
                         </a:lnSpc>
                       </a:pPr>
                       <a:r>
+                        <a:rPr lang="en" sz="1400" dirty="0">
+                          <a:latin typeface="Arial"/>
+                          <a:cs typeface="Arial"/>
+                        </a:rPr>
+                        <a:t>Loops Part II: Conditional / </a:t>
+                      </a:r>
+                      <a:r>
+                        <a:rPr lang="en" sz="1400" dirty="0">
+                          <a:latin typeface="Consolas" panose="020B0609020204030204" pitchFamily="49" charset="0"/>
+                          <a:cs typeface="Consolas" panose="020B0609020204030204" pitchFamily="49" charset="0"/>
+                        </a:rPr>
+                        <a:t>while</a:t>
+                      </a:r>
+                    </a:p>
+                  </a:txBody>
+                  <a:tcPr marL="0" marR="0" marT="0" marB="0">
+                    <a:lnL w="12700" cap="flat" cmpd="sng" algn="ctr">
+                      <a:solidFill>
+                        <a:srgbClr val="FFFFFF"/>
+                      </a:solidFill>
+                      <a:prstDash val="solid"/>
+                      <a:round/>
+                      <a:headEnd type="none" w="med" len="med"/>
+                      <a:tailEnd type="none" w="med" len="med"/>
+                    </a:lnL>
+                    <a:lnR w="12700" cap="flat" cmpd="sng" algn="ctr">
+                      <a:solidFill>
+                        <a:srgbClr val="FFFFFF"/>
+                      </a:solidFill>
+                      <a:prstDash val="solid"/>
+                      <a:round/>
+                      <a:headEnd type="none" w="med" len="med"/>
+                      <a:tailEnd type="none" w="med" len="med"/>
+                    </a:lnR>
+                    <a:lnT w="12700" cap="flat" cmpd="sng" algn="ctr">
+                      <a:solidFill>
+                        <a:srgbClr val="FFFFFF"/>
+                      </a:solidFill>
+                      <a:prstDash val="solid"/>
+                      <a:round/>
+                      <a:headEnd type="none" w="med" len="med"/>
+                      <a:tailEnd type="none" w="med" len="med"/>
+                    </a:lnT>
+                    <a:lnB w="12700" cap="flat" cmpd="sng" algn="ctr">
+                      <a:solidFill>
+                        <a:srgbClr val="FFFFFF"/>
+                      </a:solidFill>
+                      <a:prstDash val="solid"/>
+                      <a:round/>
+                      <a:headEnd type="none" w="med" len="med"/>
+                      <a:tailEnd type="none" w="med" len="med"/>
+                    </a:lnB>
+                    <a:solidFill>
+                      <a:srgbClr val="E0EFF8"/>
+                    </a:solidFill>
+                  </a:tcPr>
+                </a:tc>
+                <a:tc>
+                  <a:txBody>
+                    <a:bodyPr/>
+                    <a:lstStyle/>
+                    <a:p>
+                      <a:pPr marL="133985">
+                        <a:lnSpc>
+                          <a:spcPct val="100000"/>
+                        </a:lnSpc>
+                      </a:pPr>
+                      <a:r>
+                        <a:rPr lang="en-US" sz="1400" dirty="0">
+                          <a:latin typeface="Arial"/>
+                          <a:cs typeface="Arial"/>
+                        </a:rPr>
+                        <a:t>16:30</a:t>
+                      </a:r>
+                      <a:endParaRPr sz="1400" dirty="0">
+                        <a:latin typeface="Arial"/>
+                        <a:cs typeface="Arial"/>
+                      </a:endParaRPr>
+                    </a:p>
+                  </a:txBody>
+                  <a:tcPr marL="0" marR="0" marT="0" marB="0">
+                    <a:lnL w="12700" cap="flat" cmpd="sng" algn="ctr">
+                      <a:solidFill>
+                        <a:srgbClr val="FFFFFF"/>
+                      </a:solidFill>
+                      <a:prstDash val="solid"/>
+                      <a:round/>
+                      <a:headEnd type="none" w="med" len="med"/>
+                      <a:tailEnd type="none" w="med" len="med"/>
+                    </a:lnL>
+                    <a:lnR w="12700" cap="flat" cmpd="sng" algn="ctr">
+                      <a:solidFill>
+                        <a:srgbClr val="FFFFFF"/>
+                      </a:solidFill>
+                      <a:prstDash val="solid"/>
+                      <a:round/>
+                      <a:headEnd type="none" w="med" len="med"/>
+                      <a:tailEnd type="none" w="med" len="med"/>
+                    </a:lnR>
+                    <a:lnT w="12700" cap="flat" cmpd="sng" algn="ctr">
+                      <a:solidFill>
+                        <a:srgbClr val="FFFFFF"/>
+                      </a:solidFill>
+                      <a:prstDash val="solid"/>
+                      <a:round/>
+                      <a:headEnd type="none" w="med" len="med"/>
+                      <a:tailEnd type="none" w="med" len="med"/>
+                    </a:lnT>
+                    <a:lnB w="12700" cap="flat" cmpd="sng" algn="ctr">
+                      <a:solidFill>
+                        <a:srgbClr val="FFFFFF"/>
+                      </a:solidFill>
+                      <a:prstDash val="solid"/>
+                      <a:round/>
+                      <a:headEnd type="none" w="med" len="med"/>
+                      <a:tailEnd type="none" w="med" len="med"/>
+                    </a:lnB>
+                    <a:solidFill>
+                      <a:srgbClr val="E0EFF8"/>
+                    </a:solidFill>
+                  </a:tcPr>
+                </a:tc>
+                <a:tc>
+                  <a:txBody>
+                    <a:bodyPr/>
+                    <a:lstStyle/>
+                    <a:p>
+                      <a:pPr marL="147955">
+                        <a:lnSpc>
+                          <a:spcPct val="100000"/>
+                        </a:lnSpc>
+                      </a:pPr>
+                      <a:r>
+                        <a:rPr lang="en-US" sz="1400" dirty="0">
+                          <a:latin typeface="Arial"/>
+                          <a:cs typeface="Arial"/>
+                        </a:rPr>
+                        <a:t>16:40</a:t>
+                      </a:r>
+                      <a:endParaRPr sz="1400" dirty="0">
+                        <a:latin typeface="Arial"/>
+                        <a:cs typeface="Arial"/>
+                      </a:endParaRPr>
+                    </a:p>
+                  </a:txBody>
+                  <a:tcPr marL="0" marR="0" marT="0" marB="0">
+                    <a:lnL w="12700" cap="flat" cmpd="sng" algn="ctr">
+                      <a:solidFill>
+                        <a:srgbClr val="FFFFFF"/>
+                      </a:solidFill>
+                      <a:prstDash val="solid"/>
+                      <a:round/>
+                      <a:headEnd type="none" w="med" len="med"/>
+                      <a:tailEnd type="none" w="med" len="med"/>
+                    </a:lnL>
+                    <a:lnR w="12700" cap="flat" cmpd="sng" algn="ctr">
+                      <a:solidFill>
+                        <a:srgbClr val="FFFFFF"/>
+                      </a:solidFill>
+                      <a:prstDash val="solid"/>
+                      <a:round/>
+                      <a:headEnd type="none" w="med" len="med"/>
+                      <a:tailEnd type="none" w="med" len="med"/>
+                    </a:lnR>
+                    <a:lnT w="12700" cap="flat" cmpd="sng" algn="ctr">
+                      <a:solidFill>
+                        <a:srgbClr val="FFFFFF"/>
+                      </a:solidFill>
+                      <a:prstDash val="solid"/>
+                      <a:round/>
+                      <a:headEnd type="none" w="med" len="med"/>
+                      <a:tailEnd type="none" w="med" len="med"/>
+                    </a:lnT>
+                    <a:lnB w="12700" cap="flat" cmpd="sng" algn="ctr">
+                      <a:solidFill>
+                        <a:srgbClr val="FFFFFF"/>
+                      </a:solidFill>
+                      <a:prstDash val="solid"/>
+                      <a:round/>
+                      <a:headEnd type="none" w="med" len="med"/>
+                      <a:tailEnd type="none" w="med" len="med"/>
+                    </a:lnB>
+                    <a:solidFill>
+                      <a:srgbClr val="E0EFF8"/>
+                    </a:solidFill>
+                  </a:tcPr>
+                </a:tc>
+                <a:tc>
+                  <a:txBody>
+                    <a:bodyPr/>
+                    <a:lstStyle/>
+                    <a:p>
+                      <a:pPr marL="317500">
+                        <a:lnSpc>
+                          <a:spcPct val="100000"/>
+                        </a:lnSpc>
+                      </a:pPr>
+                      <a:r>
+                        <a:rPr lang="en-US" sz="1400" dirty="0">
+                          <a:latin typeface="Arial"/>
+                          <a:cs typeface="Arial"/>
+                        </a:rPr>
+                        <a:t>00:10</a:t>
+                      </a:r>
+                      <a:endParaRPr sz="1400" dirty="0">
+                        <a:latin typeface="Arial"/>
+                        <a:cs typeface="Arial"/>
+                      </a:endParaRPr>
+                    </a:p>
+                  </a:txBody>
+                  <a:tcPr marL="0" marR="0" marT="0" marB="0">
+                    <a:lnL w="12700" cap="flat" cmpd="sng" algn="ctr">
+                      <a:solidFill>
+                        <a:srgbClr val="FFFFFF"/>
+                      </a:solidFill>
+                      <a:prstDash val="solid"/>
+                      <a:round/>
+                      <a:headEnd type="none" w="med" len="med"/>
+                      <a:tailEnd type="none" w="med" len="med"/>
+                    </a:lnL>
+                    <a:lnR w="12700">
+                      <a:solidFill>
+                        <a:srgbClr val="FFFFFF"/>
+                      </a:solidFill>
+                      <a:prstDash val="solid"/>
+                    </a:lnR>
+                    <a:lnT w="12700" cap="flat" cmpd="sng" algn="ctr">
+                      <a:solidFill>
+                        <a:srgbClr val="FFFFFF"/>
+                      </a:solidFill>
+                      <a:prstDash val="solid"/>
+                      <a:round/>
+                      <a:headEnd type="none" w="med" len="med"/>
+                      <a:tailEnd type="none" w="med" len="med"/>
+                    </a:lnT>
+                    <a:lnB w="12700" cap="flat" cmpd="sng" algn="ctr">
+                      <a:solidFill>
+                        <a:srgbClr val="FFFFFF"/>
+                      </a:solidFill>
+                      <a:prstDash val="solid"/>
+                      <a:round/>
+                      <a:headEnd type="none" w="med" len="med"/>
+                      <a:tailEnd type="none" w="med" len="med"/>
+                    </a:lnB>
+                    <a:solidFill>
+                      <a:srgbClr val="E0EFF8"/>
+                    </a:solidFill>
+                  </a:tcPr>
+                </a:tc>
+                <a:extLst>
+                  <a:ext uri="{0D108BD9-81ED-4DB2-BD59-A6C34878D82A}">
+                    <a16:rowId xmlns:a16="http://schemas.microsoft.com/office/drawing/2014/main" val="316831696"/>
+                  </a:ext>
+                </a:extLst>
+              </a:tr>
+              <a:tr h="352531">
+                <a:tc>
+                  <a:txBody>
+                    <a:bodyPr/>
+                    <a:lstStyle/>
+                    <a:p>
+                      <a:pPr marL="635" algn="ctr">
+                        <a:lnSpc>
+                          <a:spcPct val="100000"/>
+                        </a:lnSpc>
+                      </a:pPr>
+                      <a:r>
+                        <a:rPr lang="en-US" sz="1400" dirty="0">
+                          <a:latin typeface="Arial"/>
+                          <a:cs typeface="Arial"/>
+                        </a:rPr>
+                        <a:t>05</a:t>
+                      </a:r>
+                      <a:endParaRPr sz="1400" dirty="0">
+                        <a:latin typeface="Arial"/>
+                        <a:cs typeface="Arial"/>
+                      </a:endParaRPr>
+                    </a:p>
+                  </a:txBody>
+                  <a:tcPr marL="0" marR="0" marT="0" marB="0">
+                    <a:lnL w="12700">
+                      <a:solidFill>
+                        <a:srgbClr val="FFFFFF"/>
+                      </a:solidFill>
+                      <a:prstDash val="solid"/>
+                    </a:lnL>
+                    <a:lnR w="12700" cap="flat" cmpd="sng" algn="ctr">
+                      <a:solidFill>
+                        <a:srgbClr val="FFFFFF"/>
+                      </a:solidFill>
+                      <a:prstDash val="solid"/>
+                      <a:round/>
+                      <a:headEnd type="none" w="med" len="med"/>
+                      <a:tailEnd type="none" w="med" len="med"/>
+                    </a:lnR>
+                    <a:lnT w="12700" cap="flat" cmpd="sng" algn="ctr">
+                      <a:solidFill>
+                        <a:srgbClr val="FFFFFF"/>
+                      </a:solidFill>
+                      <a:prstDash val="solid"/>
+                      <a:round/>
+                      <a:headEnd type="none" w="med" len="med"/>
+                      <a:tailEnd type="none" w="med" len="med"/>
+                    </a:lnT>
+                    <a:lnB w="12700" cap="flat" cmpd="sng" algn="ctr">
+                      <a:solidFill>
+                        <a:srgbClr val="FFFFFF"/>
+                      </a:solidFill>
+                      <a:prstDash val="solid"/>
+                      <a:round/>
+                      <a:headEnd type="none" w="med" len="med"/>
+                      <a:tailEnd type="none" w="med" len="med"/>
+                    </a:lnB>
+                    <a:solidFill>
+                      <a:srgbClr val="E0EFF8"/>
+                    </a:solidFill>
+                  </a:tcPr>
+                </a:tc>
+                <a:tc>
+                  <a:txBody>
+                    <a:bodyPr/>
+                    <a:lstStyle/>
+                    <a:p>
+                      <a:pPr marL="85090">
+                        <a:lnSpc>
+                          <a:spcPct val="100000"/>
+                        </a:lnSpc>
+                      </a:pPr>
+                      <a:r>
                         <a:rPr lang="en-US" sz="1400" dirty="0">
                           <a:latin typeface="Arial" panose="020B0604020202020204" pitchFamily="34" charset="0"/>
                           <a:cs typeface="Arial" panose="020B0604020202020204" pitchFamily="34" charset="0"/>
                         </a:rPr>
-                        <a:t>Mastering sequence types</a:t>
+                        <a:t>Mastering loops and control flow</a:t>
                       </a:r>
                       <a:endParaRPr sz="1400" dirty="0">
                         <a:latin typeface="Arial" panose="020B0604020202020204" pitchFamily="34" charset="0"/>
@@ -42607,7 +43035,7 @@
                           <a:latin typeface="Arial"/>
                           <a:cs typeface="Arial"/>
                         </a:rPr>
-                        <a:t>16:30</a:t>
+                        <a:t>16:40</a:t>
                       </a:r>
                       <a:endParaRPr sz="1400" dirty="0">
                         <a:latin typeface="Arial"/>
@@ -42737,7 +43165,7 @@
                           <a:latin typeface="Arial"/>
                           <a:cs typeface="Arial"/>
                         </a:rPr>
-                        <a:t>00:30</a:t>
+                        <a:t>00:20</a:t>
                       </a:r>
                       <a:endParaRPr sz="1400" dirty="0">
                         <a:latin typeface="Arial"/>
@@ -42786,7 +43214,7 @@
                 </a:tc>
                 <a:extLst>
                   <a:ext uri="{0D108BD9-81ED-4DB2-BD59-A6C34878D82A}">
-                    <a16:rowId xmlns:a16="http://schemas.microsoft.com/office/drawing/2014/main" val="316831696"/>
+                    <a16:rowId xmlns:a16="http://schemas.microsoft.com/office/drawing/2014/main" val="1993961095"/>
                   </a:ext>
                 </a:extLst>
               </a:tr>
@@ -43377,7 +43805,7 @@
                           <a:latin typeface="Arial"/>
                           <a:cs typeface="Arial"/>
                         </a:rPr>
-                        <a:t>00:45</a:t>
+                        <a:t>01:00</a:t>
                       </a:r>
                       <a:endParaRPr sz="1400" dirty="0">
                         <a:latin typeface="Arial"/>
@@ -43505,7 +43933,7 @@
                         </a:rPr>
                         <a:t>tal</a:t>
                       </a:r>
-                      <a:endParaRPr sz="1400">
+                      <a:endParaRPr sz="1400" dirty="0">
                         <a:latin typeface="Arial"/>
                         <a:cs typeface="Arial"/>
                       </a:endParaRPr>

</xml_diff>

<commit_message>
update session 02 links
</commit_message>
<xml_diff>
--- a/002-Control-Flow/Control Flow - Slides.pptx
+++ b/002-Control-Flow/Control Flow - Slides.pptx
@@ -13157,10 +13157,7 @@
             <a:r>
               <a:rPr lang="fr-FR" dirty="0">
                 <a:solidFill>
-                  <a:schemeClr val="tx2">
-                    <a:lumMod val="60000"/>
-                    <a:lumOff val="40000"/>
-                  </a:schemeClr>
+                  <a:schemeClr val="accent1"/>
                 </a:solidFill>
                 <a:hlinkClick r:id="rId4">
                   <a:extLst>
@@ -13170,11 +13167,7 @@
                   </a:extLst>
                 </a:hlinkClick>
               </a:rPr>
-              <a:t>Chapter 1 Exercises</a:t>
-            </a:r>
-            <a:r>
-              <a:rPr lang="fr-FR" dirty="0"/>
-              <a:t> </a:t>
+              <a:t>Chapter 1 Exercises </a:t>
             </a:r>
             <a:r>
               <a:rPr lang="fr-FR" dirty="0" err="1"/>
@@ -21652,10 +21645,7 @@
             <a:r>
               <a:rPr lang="fr-FR" dirty="0">
                 <a:solidFill>
-                  <a:schemeClr val="tx2">
-                    <a:lumMod val="60000"/>
-                    <a:lumOff val="40000"/>
-                  </a:schemeClr>
+                  <a:schemeClr val="accent1"/>
                 </a:solidFill>
                 <a:hlinkClick r:id="rId3">
                   <a:extLst>
@@ -21665,11 +21655,7 @@
                   </a:extLst>
                 </a:hlinkClick>
               </a:rPr>
-              <a:t>Chapter 2 Exercises</a:t>
-            </a:r>
-            <a:r>
-              <a:rPr lang="fr-FR" dirty="0"/>
-              <a:t> </a:t>
+              <a:t>Chapter 2 Exercises </a:t>
             </a:r>
             <a:r>
               <a:rPr lang="fr-FR" dirty="0" err="1"/>
@@ -33425,18 +33411,14 @@
                     <a:lumOff val="40000"/>
                   </a:schemeClr>
                 </a:solidFill>
-                <a:hlinkClick r:id="rId3">
-                  <a:extLst>
-                    <a:ext uri="{A12FA001-AC4F-418D-AE19-62706E023703}">
-                      <ahyp:hlinkClr xmlns:ahyp="http://schemas.microsoft.com/office/drawing/2018/hyperlinkcolor" val="tx"/>
-                    </a:ext>
-                  </a:extLst>
-                </a:hlinkClick>
+                <a:hlinkClick r:id="rId3"/>
               </a:rPr>
               <a:t>Chapter 3 Exercises</a:t>
             </a:r>
             <a:r>
-              <a:rPr lang="fr-FR" dirty="0"/>
+              <a:rPr lang="fr-FR" dirty="0">
+                <a:hlinkClick r:id="rId3"/>
+              </a:rPr>
               <a:t> </a:t>
             </a:r>
             <a:r>
@@ -48682,10 +48664,7 @@
             <a:r>
               <a:rPr lang="fr-FR" dirty="0">
                 <a:solidFill>
-                  <a:schemeClr val="tx2">
-                    <a:lumMod val="60000"/>
-                    <a:lumOff val="40000"/>
-                  </a:schemeClr>
+                  <a:schemeClr val="accent1"/>
                 </a:solidFill>
                 <a:hlinkClick r:id="rId3">
                   <a:extLst>
@@ -48695,11 +48674,7 @@
                   </a:extLst>
                 </a:hlinkClick>
               </a:rPr>
-              <a:t>Chapter 3 Exercises</a:t>
-            </a:r>
-            <a:r>
-              <a:rPr lang="fr-FR" dirty="0"/>
-              <a:t> </a:t>
+              <a:t>Chapter 4-5 Exercises </a:t>
             </a:r>
             <a:r>
               <a:rPr lang="fr-FR" dirty="0" err="1"/>
@@ -50820,10 +50795,7 @@
             <a:r>
               <a:rPr lang="fr-FR" dirty="0">
                 <a:solidFill>
-                  <a:schemeClr val="tx2">
-                    <a:lumMod val="60000"/>
-                    <a:lumOff val="40000"/>
-                  </a:schemeClr>
+                  <a:schemeClr val="accent1"/>
                 </a:solidFill>
                 <a:hlinkClick r:id="rId3">
                   <a:extLst>
@@ -50833,18 +50805,7 @@
                   </a:extLst>
                 </a:hlinkClick>
               </a:rPr>
-              <a:t>Session 1 Workshop</a:t>
-            </a:r>
-            <a:r>
-              <a:rPr lang="fr-FR" dirty="0">
-                <a:solidFill>
-                  <a:schemeClr val="tx2">
-                    <a:lumMod val="60000"/>
-                    <a:lumOff val="40000"/>
-                  </a:schemeClr>
-                </a:solidFill>
-              </a:rPr>
-              <a:t> </a:t>
+              <a:t>Session 02 Workshop </a:t>
             </a:r>
             <a:r>
               <a:rPr lang="fr-FR" dirty="0" err="1"/>

</xml_diff>